<commit_message>
Updated README for Flask project, and fixed home page
</commit_message>
<xml_diff>
--- a/Week_4/Lectures/4.2_Flask_Part_1_.pptx
+++ b/Week_4/Lectures/4.2_Flask_Part_1_.pptx
@@ -1490,9 +1490,22 @@
               <a:buNone/>
             </a:pPr>
             <a:r>
-              <a:rPr lang="en"/>
-              <a:t>A virtual environment is like having a virtual computer inside your computer. This means that whatever you do while inside the virtual computer won’t affect your</a:t>
-            </a:r>
+              <a:rPr lang="en" dirty="0"/>
+              <a:t>A virtual environment is like having a virtual computer inside your computer. This means that whatever you do while inside the virtual computer won’t affect </a:t>
+            </a:r>
+            <a:r>
+              <a:rPr lang="en" dirty="0" smtClean="0"/>
+              <a:t>your</a:t>
+            </a:r>
+            <a:r>
+              <a:rPr lang="en-US" dirty="0" smtClean="0"/>
+              <a:t> normal</a:t>
+            </a:r>
+            <a:r>
+              <a:rPr lang="en-US" baseline="0" dirty="0" smtClean="0"/>
+              <a:t> computer.</a:t>
+            </a:r>
+            <a:endParaRPr lang="en" dirty="0"/>
           </a:p>
           <a:p>
             <a:pPr lvl="0">
@@ -1501,7 +1514,7 @@
               </a:spcBef>
               <a:buNone/>
             </a:pPr>
-            <a:endParaRPr/>
+            <a:endParaRPr dirty="0"/>
           </a:p>
           <a:p>
             <a:pPr lvl="0" rtl="0">
@@ -1511,9 +1524,56 @@
               <a:buNone/>
             </a:pPr>
             <a:r>
-              <a:rPr lang="en"/>
-              <a:t>Remember: to leave the virtualenv, run “deactivate”</a:t>
-            </a:r>
+              <a:rPr lang="en" dirty="0"/>
+              <a:t>Remember: to leave the virtualenv, run “deactivate</a:t>
+            </a:r>
+            <a:r>
+              <a:rPr lang="en" dirty="0" smtClean="0"/>
+              <a:t>”</a:t>
+            </a:r>
+            <a:endParaRPr lang="en-US" dirty="0" smtClean="0"/>
+          </a:p>
+          <a:p>
+            <a:pPr lvl="0" rtl="0">
+              <a:spcBef>
+                <a:spcPts val="0"/>
+              </a:spcBef>
+              <a:buNone/>
+            </a:pPr>
+            <a:endParaRPr lang="en-US" dirty="0" smtClean="0"/>
+          </a:p>
+          <a:p>
+            <a:pPr lvl="0" rtl="0">
+              <a:spcBef>
+                <a:spcPts val="0"/>
+              </a:spcBef>
+              <a:buNone/>
+            </a:pPr>
+            <a:r>
+              <a:rPr lang="en-US" dirty="0" smtClean="0"/>
+              <a:t>If</a:t>
+            </a:r>
+            <a:r>
+              <a:rPr lang="en-US" baseline="0" dirty="0" smtClean="0"/>
+              <a:t> pip is not yet installed, install it by running “</a:t>
+            </a:r>
+            <a:r>
+              <a:rPr lang="en-US" baseline="0" dirty="0" err="1" smtClean="0"/>
+              <a:t>sudo</a:t>
+            </a:r>
+            <a:r>
+              <a:rPr lang="en-US" baseline="0" dirty="0" smtClean="0"/>
+              <a:t> </a:t>
+            </a:r>
+            <a:r>
+              <a:rPr lang="en-US" baseline="0" dirty="0" err="1" smtClean="0"/>
+              <a:t>easy_install</a:t>
+            </a:r>
+            <a:r>
+              <a:rPr lang="en-US" baseline="0" smtClean="0"/>
+              <a:t> pip”</a:t>
+            </a:r>
+            <a:endParaRPr lang="en-US" dirty="0" smtClean="0"/>
           </a:p>
         </p:txBody>
       </p:sp>

</xml_diff>